<commit_message>
slidify function version 1, only unix and powerpoint
</commit_message>
<xml_diff>
--- a/inst/ressources/targeter-report.pptx
+++ b/inst/ressources/targeter-report.pptx
@@ -719,8 +719,14 @@
           </a:xfrm>
         </p:spPr>
         <p:txBody>
-          <a:bodyPr/>
-          <a:lstStyle/>
+          <a:bodyPr>
+            <a:normAutofit/>
+          </a:bodyPr>
+          <a:lstStyle>
+            <a:lvl1pPr>
+              <a:defRPr sz="1800"/>
+            </a:lvl1pPr>
+          </a:lstStyle>
           <a:p>
             <a:r>
               <a:rPr lang="en-US"/>
@@ -909,6 +915,151 @@
               <a:t>‹#›</a:t>
             </a:fld>
             <a:endParaRPr lang="en-US"/>
+          </a:p>
+        </p:txBody>
+      </p:sp>
+      <p:sp>
+        <p:nvSpPr>
+          <p:cNvPr id="11" name="Right Triangle 10">
+            <a:extLst>
+              <a:ext uri="{FF2B5EF4-FFF2-40B4-BE49-F238E27FC236}">
+                <a16:creationId xmlns:a16="http://schemas.microsoft.com/office/drawing/2014/main" id="{222A67BA-BE52-FC72-4FBB-EA6BED7666C4}"/>
+              </a:ext>
+            </a:extLst>
+          </p:cNvPr>
+          <p:cNvSpPr/>
+          <p:nvPr userDrawn="1"/>
+        </p:nvSpPr>
+        <p:spPr>
+          <a:xfrm rot="10800000">
+            <a:off x="6765897" y="-102623"/>
+            <a:ext cx="2483708" cy="1315130"/>
+          </a:xfrm>
+          <a:prstGeom prst="rtTriangle">
+            <a:avLst/>
+          </a:prstGeom>
+          <a:solidFill>
+            <a:schemeClr val="accent5">
+              <a:lumMod val="20000"/>
+              <a:lumOff val="80000"/>
+            </a:schemeClr>
+          </a:solidFill>
+          <a:ln>
+            <a:noFill/>
+          </a:ln>
+        </p:spPr>
+        <p:style>
+          <a:lnRef idx="1">
+            <a:schemeClr val="accent1"/>
+          </a:lnRef>
+          <a:fillRef idx="3">
+            <a:schemeClr val="accent1"/>
+          </a:fillRef>
+          <a:effectRef idx="2">
+            <a:schemeClr val="accent1"/>
+          </a:effectRef>
+          <a:fontRef idx="minor">
+            <a:schemeClr val="lt1"/>
+          </a:fontRef>
+        </p:style>
+        <p:txBody>
+          <a:bodyPr rtlCol="0" anchor="ctr"/>
+          <a:lstStyle/>
+          <a:p>
+            <a:pPr algn="ctr"/>
+            <a:endParaRPr lang="fr-BE">
+              <a:latin typeface="Microsoft JhengHei Light" panose="020B0304030504040204" pitchFamily="34" charset="-120"/>
+              <a:ea typeface="Microsoft JhengHei Light" panose="020B0304030504040204" pitchFamily="34" charset="-120"/>
+            </a:endParaRPr>
+          </a:p>
+        </p:txBody>
+      </p:sp>
+      <p:pic>
+        <p:nvPicPr>
+          <p:cNvPr id="8" name="Picture 7" descr="A logo with blue circles and a green heart&#10;&#10;AI-generated content may be incorrect.">
+            <a:extLst>
+              <a:ext uri="{FF2B5EF4-FFF2-40B4-BE49-F238E27FC236}">
+                <a16:creationId xmlns:a16="http://schemas.microsoft.com/office/drawing/2014/main" id="{AD35A1B8-70CD-E588-6492-DE8BEEB0986B}"/>
+              </a:ext>
+            </a:extLst>
+          </p:cNvPr>
+          <p:cNvPicPr>
+            <a:picLocks noChangeAspect="1"/>
+          </p:cNvPicPr>
+          <p:nvPr userDrawn="1"/>
+        </p:nvPicPr>
+        <p:blipFill>
+          <a:blip r:embed="rId2"/>
+          <a:stretch>
+            <a:fillRect/>
+          </a:stretch>
+        </p:blipFill>
+        <p:spPr>
+          <a:xfrm>
+            <a:off x="8143094" y="102393"/>
+            <a:ext cx="1137403" cy="805281"/>
+          </a:xfrm>
+          <a:prstGeom prst="rect">
+            <a:avLst/>
+          </a:prstGeom>
+        </p:spPr>
+      </p:pic>
+      <p:sp>
+        <p:nvSpPr>
+          <p:cNvPr id="9" name="TextBox 8">
+            <a:extLst>
+              <a:ext uri="{FF2B5EF4-FFF2-40B4-BE49-F238E27FC236}">
+                <a16:creationId xmlns:a16="http://schemas.microsoft.com/office/drawing/2014/main" id="{37F90391-B56F-D707-CEEE-90E51666CD05}"/>
+              </a:ext>
+            </a:extLst>
+          </p:cNvPr>
+          <p:cNvSpPr txBox="1"/>
+          <p:nvPr userDrawn="1"/>
+        </p:nvSpPr>
+        <p:spPr>
+          <a:xfrm>
+            <a:off x="7698259" y="12356"/>
+            <a:ext cx="1438214" cy="246221"/>
+          </a:xfrm>
+          <a:prstGeom prst="rect">
+            <a:avLst/>
+          </a:prstGeom>
+          <a:noFill/>
+        </p:spPr>
+        <p:txBody>
+          <a:bodyPr wrap="none" rtlCol="0">
+            <a:spAutoFit/>
+          </a:bodyPr>
+          <a:lstStyle/>
+          <a:p>
+            <a:r>
+              <a:rPr lang="fr-BE" sz="1000" i="1" dirty="0" err="1">
+                <a:latin typeface="Microsoft JhengHei Light" panose="020B0304030504040204" pitchFamily="34" charset="-120"/>
+                <a:ea typeface="Microsoft JhengHei Light" panose="020B0304030504040204" pitchFamily="34" charset="-120"/>
+              </a:rPr>
+              <a:t>powered</a:t>
+            </a:r>
+            <a:r>
+              <a:rPr lang="fr-BE" sz="1000" i="1" dirty="0">
+                <a:latin typeface="Microsoft JhengHei Light" panose="020B0304030504040204" pitchFamily="34" charset="-120"/>
+                <a:ea typeface="Microsoft JhengHei Light" panose="020B0304030504040204" pitchFamily="34" charset="-120"/>
+              </a:rPr>
+              <a:t> </a:t>
+            </a:r>
+            <a:r>
+              <a:rPr lang="fr-BE" sz="1000" i="1" dirty="0" err="1">
+                <a:latin typeface="Microsoft JhengHei Light" panose="020B0304030504040204" pitchFamily="34" charset="-120"/>
+                <a:ea typeface="Microsoft JhengHei Light" panose="020B0304030504040204" pitchFamily="34" charset="-120"/>
+              </a:rPr>
+              <a:t>with</a:t>
+            </a:r>
+            <a:r>
+              <a:rPr lang="fr-BE" sz="1000" i="1" dirty="0">
+                <a:latin typeface="Microsoft JhengHei Light" panose="020B0304030504040204" pitchFamily="34" charset="-120"/>
+                <a:ea typeface="Microsoft JhengHei Light" panose="020B0304030504040204" pitchFamily="34" charset="-120"/>
+              </a:rPr>
+              <a:t> love by</a:t>
+            </a:r>
           </a:p>
         </p:txBody>
       </p:sp>
@@ -1327,35 +1478,35 @@
           <a:p>
             <a:pPr lvl="0"/>
             <a:r>
-              <a:rPr lang="en-US"/>
+              <a:rPr lang="en-US" dirty="0"/>
               <a:t>Click to edit Master text styles</a:t>
             </a:r>
           </a:p>
           <a:p>
             <a:pPr lvl="1"/>
             <a:r>
-              <a:rPr lang="en-US"/>
+              <a:rPr lang="en-US" dirty="0"/>
               <a:t>Second level</a:t>
             </a:r>
           </a:p>
           <a:p>
             <a:pPr lvl="2"/>
             <a:r>
-              <a:rPr lang="en-US"/>
+              <a:rPr lang="en-US" dirty="0"/>
               <a:t>Third level</a:t>
             </a:r>
           </a:p>
           <a:p>
             <a:pPr lvl="3"/>
             <a:r>
-              <a:rPr lang="en-US"/>
+              <a:rPr lang="en-US" dirty="0"/>
               <a:t>Fourth level</a:t>
             </a:r>
           </a:p>
           <a:p>
             <a:pPr lvl="4"/>
             <a:r>
-              <a:rPr lang="en-US"/>
+              <a:rPr lang="en-US" dirty="0"/>
               <a:t>Fifth level</a:t>
             </a:r>
           </a:p>
@@ -1426,6 +1577,212 @@
           </a:p>
         </p:txBody>
       </p:sp>
+      <p:grpSp>
+        <p:nvGrpSpPr>
+          <p:cNvPr id="12" name="Group 11">
+            <a:extLst>
+              <a:ext uri="{FF2B5EF4-FFF2-40B4-BE49-F238E27FC236}">
+                <a16:creationId xmlns:a16="http://schemas.microsoft.com/office/drawing/2014/main" id="{C0194EB9-9EC5-CFCD-690D-D3D59E5DBAF3}"/>
+              </a:ext>
+            </a:extLst>
+          </p:cNvPr>
+          <p:cNvGrpSpPr/>
+          <p:nvPr userDrawn="1"/>
+        </p:nvGrpSpPr>
+        <p:grpSpPr>
+          <a:xfrm>
+            <a:off x="457200" y="-102623"/>
+            <a:ext cx="8823297" cy="1315130"/>
+            <a:chOff x="457200" y="-102623"/>
+            <a:chExt cx="8823297" cy="1315130"/>
+          </a:xfrm>
+        </p:grpSpPr>
+        <p:cxnSp>
+          <p:nvCxnSpPr>
+            <p:cNvPr id="10" name="Straight Connector 9">
+              <a:extLst>
+                <a:ext uri="{FF2B5EF4-FFF2-40B4-BE49-F238E27FC236}">
+                  <a16:creationId xmlns:a16="http://schemas.microsoft.com/office/drawing/2014/main" id="{E0B8D830-BC1A-F129-A884-FC4C329F053F}"/>
+                </a:ext>
+              </a:extLst>
+            </p:cNvPr>
+            <p:cNvCxnSpPr>
+              <a:cxnSpLocks/>
+            </p:cNvCxnSpPr>
+            <p:nvPr userDrawn="1"/>
+          </p:nvCxnSpPr>
+          <p:spPr>
+            <a:xfrm>
+              <a:off x="457200" y="1063229"/>
+              <a:ext cx="8686800" cy="0"/>
+            </a:xfrm>
+            <a:prstGeom prst="line">
+              <a:avLst/>
+            </a:prstGeom>
+            <a:ln w="9525"/>
+            <a:effectLst/>
+          </p:spPr>
+          <p:style>
+            <a:lnRef idx="2">
+              <a:schemeClr val="accent2"/>
+            </a:lnRef>
+            <a:fillRef idx="0">
+              <a:schemeClr val="accent2"/>
+            </a:fillRef>
+            <a:effectRef idx="1">
+              <a:schemeClr val="accent2"/>
+            </a:effectRef>
+            <a:fontRef idx="minor">
+              <a:schemeClr val="tx1"/>
+            </a:fontRef>
+          </p:style>
+        </p:cxnSp>
+        <p:sp>
+          <p:nvSpPr>
+            <p:cNvPr id="7" name="Right Triangle 6">
+              <a:extLst>
+                <a:ext uri="{FF2B5EF4-FFF2-40B4-BE49-F238E27FC236}">
+                  <a16:creationId xmlns:a16="http://schemas.microsoft.com/office/drawing/2014/main" id="{210036AC-21A5-0281-34F8-2EC5F97A88B7}"/>
+                </a:ext>
+              </a:extLst>
+            </p:cNvPr>
+            <p:cNvSpPr/>
+            <p:nvPr userDrawn="1"/>
+          </p:nvSpPr>
+          <p:spPr>
+            <a:xfrm rot="10800000">
+              <a:off x="6765897" y="-102623"/>
+              <a:ext cx="2483708" cy="1315130"/>
+            </a:xfrm>
+            <a:prstGeom prst="rtTriangle">
+              <a:avLst/>
+            </a:prstGeom>
+            <a:solidFill>
+              <a:schemeClr val="accent5">
+                <a:lumMod val="20000"/>
+                <a:lumOff val="80000"/>
+              </a:schemeClr>
+            </a:solidFill>
+            <a:ln>
+              <a:noFill/>
+            </a:ln>
+          </p:spPr>
+          <p:style>
+            <a:lnRef idx="1">
+              <a:schemeClr val="accent1"/>
+            </a:lnRef>
+            <a:fillRef idx="3">
+              <a:schemeClr val="accent1"/>
+            </a:fillRef>
+            <a:effectRef idx="2">
+              <a:schemeClr val="accent1"/>
+            </a:effectRef>
+            <a:fontRef idx="minor">
+              <a:schemeClr val="lt1"/>
+            </a:fontRef>
+          </p:style>
+          <p:txBody>
+            <a:bodyPr rtlCol="0" anchor="ctr"/>
+            <a:lstStyle/>
+            <a:p>
+              <a:pPr algn="ctr"/>
+              <a:endParaRPr lang="fr-BE">
+                <a:latin typeface="Microsoft JhengHei Light" panose="020B0304030504040204" pitchFamily="34" charset="-120"/>
+                <a:ea typeface="Microsoft JhengHei Light" panose="020B0304030504040204" pitchFamily="34" charset="-120"/>
+              </a:endParaRPr>
+            </a:p>
+          </p:txBody>
+        </p:sp>
+        <p:pic>
+          <p:nvPicPr>
+            <p:cNvPr id="8" name="Picture 7" descr="A logo with blue circles and a green heart&#10;&#10;AI-generated content may be incorrect.">
+              <a:extLst>
+                <a:ext uri="{FF2B5EF4-FFF2-40B4-BE49-F238E27FC236}">
+                  <a16:creationId xmlns:a16="http://schemas.microsoft.com/office/drawing/2014/main" id="{0F0EDA00-21C4-6B60-8B7B-2AD50496A043}"/>
+                </a:ext>
+              </a:extLst>
+            </p:cNvPr>
+            <p:cNvPicPr>
+              <a:picLocks noChangeAspect="1"/>
+            </p:cNvPicPr>
+            <p:nvPr userDrawn="1"/>
+          </p:nvPicPr>
+          <p:blipFill>
+            <a:blip r:embed="rId2"/>
+            <a:stretch>
+              <a:fillRect/>
+            </a:stretch>
+          </p:blipFill>
+          <p:spPr>
+            <a:xfrm>
+              <a:off x="8143094" y="102393"/>
+              <a:ext cx="1137403" cy="805281"/>
+            </a:xfrm>
+            <a:prstGeom prst="rect">
+              <a:avLst/>
+            </a:prstGeom>
+          </p:spPr>
+        </p:pic>
+        <p:sp>
+          <p:nvSpPr>
+            <p:cNvPr id="9" name="TextBox 8">
+              <a:extLst>
+                <a:ext uri="{FF2B5EF4-FFF2-40B4-BE49-F238E27FC236}">
+                  <a16:creationId xmlns:a16="http://schemas.microsoft.com/office/drawing/2014/main" id="{24D0F32F-187E-68E6-E732-2CCBAB5F8D87}"/>
+                </a:ext>
+              </a:extLst>
+            </p:cNvPr>
+            <p:cNvSpPr txBox="1"/>
+            <p:nvPr userDrawn="1"/>
+          </p:nvSpPr>
+          <p:spPr>
+            <a:xfrm>
+              <a:off x="7698259" y="12356"/>
+              <a:ext cx="1438214" cy="246221"/>
+            </a:xfrm>
+            <a:prstGeom prst="rect">
+              <a:avLst/>
+            </a:prstGeom>
+            <a:noFill/>
+          </p:spPr>
+          <p:txBody>
+            <a:bodyPr wrap="none" rtlCol="0">
+              <a:spAutoFit/>
+            </a:bodyPr>
+            <a:lstStyle/>
+            <a:p>
+              <a:r>
+                <a:rPr lang="fr-BE" sz="1000" i="1" dirty="0" err="1">
+                  <a:latin typeface="Microsoft JhengHei Light" panose="020B0304030504040204" pitchFamily="34" charset="-120"/>
+                  <a:ea typeface="Microsoft JhengHei Light" panose="020B0304030504040204" pitchFamily="34" charset="-120"/>
+                </a:rPr>
+                <a:t>powered</a:t>
+              </a:r>
+              <a:r>
+                <a:rPr lang="fr-BE" sz="1000" i="1" dirty="0">
+                  <a:latin typeface="Microsoft JhengHei Light" panose="020B0304030504040204" pitchFamily="34" charset="-120"/>
+                  <a:ea typeface="Microsoft JhengHei Light" panose="020B0304030504040204" pitchFamily="34" charset="-120"/>
+                </a:rPr>
+                <a:t> </a:t>
+              </a:r>
+              <a:r>
+                <a:rPr lang="fr-BE" sz="1000" i="1" dirty="0" err="1">
+                  <a:latin typeface="Microsoft JhengHei Light" panose="020B0304030504040204" pitchFamily="34" charset="-120"/>
+                  <a:ea typeface="Microsoft JhengHei Light" panose="020B0304030504040204" pitchFamily="34" charset="-120"/>
+                </a:rPr>
+                <a:t>with</a:t>
+              </a:r>
+              <a:r>
+                <a:rPr lang="fr-BE" sz="1000" i="1" dirty="0">
+                  <a:latin typeface="Microsoft JhengHei Light" panose="020B0304030504040204" pitchFamily="34" charset="-120"/>
+                  <a:ea typeface="Microsoft JhengHei Light" panose="020B0304030504040204" pitchFamily="34" charset="-120"/>
+                </a:rPr>
+                <a:t> love by</a:t>
+              </a:r>
+            </a:p>
+          </p:txBody>
+        </p:sp>
+      </p:grpSp>
     </p:spTree>
     <p:extLst>
       <p:ext uri="{BB962C8B-B14F-4D97-AF65-F5344CB8AC3E}">
@@ -1671,6 +2028,191 @@
           </a:p>
         </p:txBody>
       </p:sp>
+      <p:sp>
+        <p:nvSpPr>
+          <p:cNvPr id="8" name="Right Triangle 7">
+            <a:extLst>
+              <a:ext uri="{FF2B5EF4-FFF2-40B4-BE49-F238E27FC236}">
+                <a16:creationId xmlns:a16="http://schemas.microsoft.com/office/drawing/2014/main" id="{770E125C-D170-8DCE-F9F3-9595200DC2A7}"/>
+              </a:ext>
+            </a:extLst>
+          </p:cNvPr>
+          <p:cNvSpPr/>
+          <p:nvPr userDrawn="1"/>
+        </p:nvSpPr>
+        <p:spPr>
+          <a:xfrm rot="10800000">
+            <a:off x="6765897" y="-102623"/>
+            <a:ext cx="2483708" cy="1315130"/>
+          </a:xfrm>
+          <a:prstGeom prst="rtTriangle">
+            <a:avLst/>
+          </a:prstGeom>
+          <a:solidFill>
+            <a:schemeClr val="accent5">
+              <a:lumMod val="20000"/>
+              <a:lumOff val="80000"/>
+            </a:schemeClr>
+          </a:solidFill>
+          <a:ln>
+            <a:noFill/>
+          </a:ln>
+        </p:spPr>
+        <p:style>
+          <a:lnRef idx="1">
+            <a:schemeClr val="accent1"/>
+          </a:lnRef>
+          <a:fillRef idx="3">
+            <a:schemeClr val="accent1"/>
+          </a:fillRef>
+          <a:effectRef idx="2">
+            <a:schemeClr val="accent1"/>
+          </a:effectRef>
+          <a:fontRef idx="minor">
+            <a:schemeClr val="lt1"/>
+          </a:fontRef>
+        </p:style>
+        <p:txBody>
+          <a:bodyPr rtlCol="0" anchor="ctr"/>
+          <a:lstStyle/>
+          <a:p>
+            <a:pPr algn="ctr"/>
+            <a:endParaRPr lang="fr-BE">
+              <a:latin typeface="Microsoft JhengHei Light" panose="020B0304030504040204" pitchFamily="34" charset="-120"/>
+              <a:ea typeface="Microsoft JhengHei Light" panose="020B0304030504040204" pitchFamily="34" charset="-120"/>
+            </a:endParaRPr>
+          </a:p>
+        </p:txBody>
+      </p:sp>
+      <p:pic>
+        <p:nvPicPr>
+          <p:cNvPr id="9" name="Picture 8" descr="A logo with blue circles and a green heart&#10;&#10;AI-generated content may be incorrect.">
+            <a:extLst>
+              <a:ext uri="{FF2B5EF4-FFF2-40B4-BE49-F238E27FC236}">
+                <a16:creationId xmlns:a16="http://schemas.microsoft.com/office/drawing/2014/main" id="{69174F49-CDE4-DAC7-5A99-8BF1A85AB1B8}"/>
+              </a:ext>
+            </a:extLst>
+          </p:cNvPr>
+          <p:cNvPicPr>
+            <a:picLocks noChangeAspect="1"/>
+          </p:cNvPicPr>
+          <p:nvPr userDrawn="1"/>
+        </p:nvPicPr>
+        <p:blipFill>
+          <a:blip r:embed="rId2"/>
+          <a:stretch>
+            <a:fillRect/>
+          </a:stretch>
+        </p:blipFill>
+        <p:spPr>
+          <a:xfrm>
+            <a:off x="8143094" y="102393"/>
+            <a:ext cx="1137403" cy="805281"/>
+          </a:xfrm>
+          <a:prstGeom prst="rect">
+            <a:avLst/>
+          </a:prstGeom>
+        </p:spPr>
+      </p:pic>
+      <p:sp>
+        <p:nvSpPr>
+          <p:cNvPr id="10" name="TextBox 9">
+            <a:extLst>
+              <a:ext uri="{FF2B5EF4-FFF2-40B4-BE49-F238E27FC236}">
+                <a16:creationId xmlns:a16="http://schemas.microsoft.com/office/drawing/2014/main" id="{12225F73-A2D4-3AD5-6A69-9F21F4988A84}"/>
+              </a:ext>
+            </a:extLst>
+          </p:cNvPr>
+          <p:cNvSpPr txBox="1"/>
+          <p:nvPr userDrawn="1"/>
+        </p:nvSpPr>
+        <p:spPr>
+          <a:xfrm>
+            <a:off x="7698259" y="12356"/>
+            <a:ext cx="1438214" cy="246221"/>
+          </a:xfrm>
+          <a:prstGeom prst="rect">
+            <a:avLst/>
+          </a:prstGeom>
+          <a:noFill/>
+        </p:spPr>
+        <p:txBody>
+          <a:bodyPr wrap="none" rtlCol="0">
+            <a:spAutoFit/>
+          </a:bodyPr>
+          <a:lstStyle/>
+          <a:p>
+            <a:r>
+              <a:rPr lang="fr-BE" sz="1000" i="1" dirty="0" err="1">
+                <a:latin typeface="Microsoft JhengHei Light" panose="020B0304030504040204" pitchFamily="34" charset="-120"/>
+                <a:ea typeface="Microsoft JhengHei Light" panose="020B0304030504040204" pitchFamily="34" charset="-120"/>
+              </a:rPr>
+              <a:t>powered</a:t>
+            </a:r>
+            <a:r>
+              <a:rPr lang="fr-BE" sz="1000" i="1" dirty="0">
+                <a:latin typeface="Microsoft JhengHei Light" panose="020B0304030504040204" pitchFamily="34" charset="-120"/>
+                <a:ea typeface="Microsoft JhengHei Light" panose="020B0304030504040204" pitchFamily="34" charset="-120"/>
+              </a:rPr>
+              <a:t> </a:t>
+            </a:r>
+            <a:r>
+              <a:rPr lang="fr-BE" sz="1000" i="1" dirty="0" err="1">
+                <a:latin typeface="Microsoft JhengHei Light" panose="020B0304030504040204" pitchFamily="34" charset="-120"/>
+                <a:ea typeface="Microsoft JhengHei Light" panose="020B0304030504040204" pitchFamily="34" charset="-120"/>
+              </a:rPr>
+              <a:t>with</a:t>
+            </a:r>
+            <a:r>
+              <a:rPr lang="fr-BE" sz="1000" i="1" dirty="0">
+                <a:latin typeface="Microsoft JhengHei Light" panose="020B0304030504040204" pitchFamily="34" charset="-120"/>
+                <a:ea typeface="Microsoft JhengHei Light" panose="020B0304030504040204" pitchFamily="34" charset="-120"/>
+              </a:rPr>
+              <a:t> love by</a:t>
+            </a:r>
+          </a:p>
+        </p:txBody>
+      </p:sp>
+      <p:cxnSp>
+        <p:nvCxnSpPr>
+          <p:cNvPr id="11" name="Straight Connector 10">
+            <a:extLst>
+              <a:ext uri="{FF2B5EF4-FFF2-40B4-BE49-F238E27FC236}">
+                <a16:creationId xmlns:a16="http://schemas.microsoft.com/office/drawing/2014/main" id="{7067712D-8162-0C61-4EC8-6C032C036638}"/>
+              </a:ext>
+            </a:extLst>
+          </p:cNvPr>
+          <p:cNvCxnSpPr>
+            <a:cxnSpLocks/>
+          </p:cNvCxnSpPr>
+          <p:nvPr userDrawn="1"/>
+        </p:nvCxnSpPr>
+        <p:spPr>
+          <a:xfrm>
+            <a:off x="722313" y="3305175"/>
+            <a:ext cx="7772400" cy="0"/>
+          </a:xfrm>
+          <a:prstGeom prst="line">
+            <a:avLst/>
+          </a:prstGeom>
+          <a:ln w="9525"/>
+          <a:effectLst/>
+        </p:spPr>
+        <p:style>
+          <a:lnRef idx="2">
+            <a:schemeClr val="accent2"/>
+          </a:lnRef>
+          <a:fillRef idx="0">
+            <a:schemeClr val="accent2"/>
+          </a:fillRef>
+          <a:effectRef idx="1">
+            <a:schemeClr val="accent2"/>
+          </a:effectRef>
+          <a:fontRef idx="minor">
+            <a:schemeClr val="tx1"/>
+          </a:fontRef>
+        </p:style>
+      </p:cxnSp>
     </p:spTree>
     <p:extLst>
       <p:ext uri="{BB962C8B-B14F-4D97-AF65-F5344CB8AC3E}">
@@ -1740,22 +2282,24 @@
           </a:xfrm>
         </p:spPr>
         <p:txBody>
-          <a:bodyPr/>
+          <a:bodyPr>
+            <a:normAutofit/>
+          </a:bodyPr>
           <a:lstStyle>
             <a:lvl1pPr>
-              <a:defRPr sz="2100"/>
+              <a:defRPr sz="1200"/>
             </a:lvl1pPr>
             <a:lvl2pPr>
-              <a:defRPr sz="1800"/>
+              <a:defRPr sz="1050"/>
             </a:lvl2pPr>
             <a:lvl3pPr>
-              <a:defRPr sz="1500"/>
+              <a:defRPr sz="1000"/>
             </a:lvl3pPr>
             <a:lvl4pPr>
-              <a:defRPr sz="1350"/>
+              <a:defRPr sz="900"/>
             </a:lvl4pPr>
             <a:lvl5pPr>
-              <a:defRPr sz="1350"/>
+              <a:defRPr sz="900"/>
             </a:lvl5pPr>
             <a:lvl6pPr>
               <a:defRPr sz="1350"/>
@@ -1773,35 +2317,35 @@
           <a:p>
             <a:pPr lvl="0"/>
             <a:r>
-              <a:rPr lang="en-US"/>
+              <a:rPr lang="en-US" dirty="0"/>
               <a:t>Click to edit Master text styles</a:t>
             </a:r>
           </a:p>
           <a:p>
             <a:pPr lvl="1"/>
             <a:r>
-              <a:rPr lang="en-US"/>
+              <a:rPr lang="en-US" dirty="0"/>
               <a:t>Second level</a:t>
             </a:r>
           </a:p>
           <a:p>
             <a:pPr lvl="2"/>
             <a:r>
-              <a:rPr lang="en-US"/>
+              <a:rPr lang="en-US" dirty="0"/>
               <a:t>Third level</a:t>
             </a:r>
           </a:p>
           <a:p>
             <a:pPr lvl="3"/>
             <a:r>
-              <a:rPr lang="en-US"/>
+              <a:rPr lang="en-US" dirty="0"/>
               <a:t>Fourth level</a:t>
             </a:r>
           </a:p>
           <a:p>
             <a:pPr lvl="4"/>
             <a:r>
-              <a:rPr lang="en-US"/>
+              <a:rPr lang="en-US" dirty="0"/>
               <a:t>Fifth level</a:t>
             </a:r>
           </a:p>
@@ -1824,22 +2368,24 @@
           </a:xfrm>
         </p:spPr>
         <p:txBody>
-          <a:bodyPr/>
+          <a:bodyPr>
+            <a:normAutofit/>
+          </a:bodyPr>
           <a:lstStyle>
             <a:lvl1pPr>
-              <a:defRPr sz="2100"/>
+              <a:defRPr sz="1200"/>
             </a:lvl1pPr>
             <a:lvl2pPr>
-              <a:defRPr sz="1800"/>
+              <a:defRPr sz="1050"/>
             </a:lvl2pPr>
             <a:lvl3pPr>
-              <a:defRPr sz="1500"/>
+              <a:defRPr sz="1000"/>
             </a:lvl3pPr>
             <a:lvl4pPr>
-              <a:defRPr sz="1350"/>
+              <a:defRPr sz="900"/>
             </a:lvl4pPr>
             <a:lvl5pPr>
-              <a:defRPr sz="1350"/>
+              <a:defRPr sz="900"/>
             </a:lvl5pPr>
             <a:lvl6pPr>
               <a:defRPr sz="1350"/>
@@ -1956,6 +2502,212 @@
           </a:p>
         </p:txBody>
       </p:sp>
+      <p:grpSp>
+        <p:nvGrpSpPr>
+          <p:cNvPr id="12" name="Group 11">
+            <a:extLst>
+              <a:ext uri="{FF2B5EF4-FFF2-40B4-BE49-F238E27FC236}">
+                <a16:creationId xmlns:a16="http://schemas.microsoft.com/office/drawing/2014/main" id="{E6DEADA7-B4AB-783B-9F32-0B7E87ECA271}"/>
+              </a:ext>
+            </a:extLst>
+          </p:cNvPr>
+          <p:cNvGrpSpPr/>
+          <p:nvPr userDrawn="1"/>
+        </p:nvGrpSpPr>
+        <p:grpSpPr>
+          <a:xfrm>
+            <a:off x="457200" y="-102623"/>
+            <a:ext cx="8823297" cy="1315130"/>
+            <a:chOff x="457200" y="-102623"/>
+            <a:chExt cx="8823297" cy="1315130"/>
+          </a:xfrm>
+        </p:grpSpPr>
+        <p:cxnSp>
+          <p:nvCxnSpPr>
+            <p:cNvPr id="13" name="Straight Connector 12">
+              <a:extLst>
+                <a:ext uri="{FF2B5EF4-FFF2-40B4-BE49-F238E27FC236}">
+                  <a16:creationId xmlns:a16="http://schemas.microsoft.com/office/drawing/2014/main" id="{03992BBD-A59D-A353-33D0-7C1DCC99457E}"/>
+                </a:ext>
+              </a:extLst>
+            </p:cNvPr>
+            <p:cNvCxnSpPr>
+              <a:cxnSpLocks/>
+            </p:cNvCxnSpPr>
+            <p:nvPr userDrawn="1"/>
+          </p:nvCxnSpPr>
+          <p:spPr>
+            <a:xfrm>
+              <a:off x="457200" y="1063229"/>
+              <a:ext cx="8686800" cy="0"/>
+            </a:xfrm>
+            <a:prstGeom prst="line">
+              <a:avLst/>
+            </a:prstGeom>
+            <a:ln w="9525"/>
+            <a:effectLst/>
+          </p:spPr>
+          <p:style>
+            <a:lnRef idx="2">
+              <a:schemeClr val="accent2"/>
+            </a:lnRef>
+            <a:fillRef idx="0">
+              <a:schemeClr val="accent2"/>
+            </a:fillRef>
+            <a:effectRef idx="1">
+              <a:schemeClr val="accent2"/>
+            </a:effectRef>
+            <a:fontRef idx="minor">
+              <a:schemeClr val="tx1"/>
+            </a:fontRef>
+          </p:style>
+        </p:cxnSp>
+        <p:sp>
+          <p:nvSpPr>
+            <p:cNvPr id="14" name="Right Triangle 13">
+              <a:extLst>
+                <a:ext uri="{FF2B5EF4-FFF2-40B4-BE49-F238E27FC236}">
+                  <a16:creationId xmlns:a16="http://schemas.microsoft.com/office/drawing/2014/main" id="{7AC5CDE6-9B66-320D-AD43-8C9BCC21B4B0}"/>
+                </a:ext>
+              </a:extLst>
+            </p:cNvPr>
+            <p:cNvSpPr/>
+            <p:nvPr userDrawn="1"/>
+          </p:nvSpPr>
+          <p:spPr>
+            <a:xfrm rot="10800000">
+              <a:off x="6765897" y="-102623"/>
+              <a:ext cx="2483708" cy="1315130"/>
+            </a:xfrm>
+            <a:prstGeom prst="rtTriangle">
+              <a:avLst/>
+            </a:prstGeom>
+            <a:solidFill>
+              <a:schemeClr val="accent5">
+                <a:lumMod val="20000"/>
+                <a:lumOff val="80000"/>
+              </a:schemeClr>
+            </a:solidFill>
+            <a:ln>
+              <a:noFill/>
+            </a:ln>
+          </p:spPr>
+          <p:style>
+            <a:lnRef idx="1">
+              <a:schemeClr val="accent1"/>
+            </a:lnRef>
+            <a:fillRef idx="3">
+              <a:schemeClr val="accent1"/>
+            </a:fillRef>
+            <a:effectRef idx="2">
+              <a:schemeClr val="accent1"/>
+            </a:effectRef>
+            <a:fontRef idx="minor">
+              <a:schemeClr val="lt1"/>
+            </a:fontRef>
+          </p:style>
+          <p:txBody>
+            <a:bodyPr rtlCol="0" anchor="ctr"/>
+            <a:lstStyle/>
+            <a:p>
+              <a:pPr algn="ctr"/>
+              <a:endParaRPr lang="fr-BE">
+                <a:latin typeface="Microsoft JhengHei Light" panose="020B0304030504040204" pitchFamily="34" charset="-120"/>
+                <a:ea typeface="Microsoft JhengHei Light" panose="020B0304030504040204" pitchFamily="34" charset="-120"/>
+              </a:endParaRPr>
+            </a:p>
+          </p:txBody>
+        </p:sp>
+        <p:pic>
+          <p:nvPicPr>
+            <p:cNvPr id="15" name="Picture 14" descr="A logo with blue circles and a green heart&#10;&#10;AI-generated content may be incorrect.">
+              <a:extLst>
+                <a:ext uri="{FF2B5EF4-FFF2-40B4-BE49-F238E27FC236}">
+                  <a16:creationId xmlns:a16="http://schemas.microsoft.com/office/drawing/2014/main" id="{71D3F5FA-20DE-7E13-EE6A-AEFBB32515B8}"/>
+                </a:ext>
+              </a:extLst>
+            </p:cNvPr>
+            <p:cNvPicPr>
+              <a:picLocks noChangeAspect="1"/>
+            </p:cNvPicPr>
+            <p:nvPr userDrawn="1"/>
+          </p:nvPicPr>
+          <p:blipFill>
+            <a:blip r:embed="rId2"/>
+            <a:stretch>
+              <a:fillRect/>
+            </a:stretch>
+          </p:blipFill>
+          <p:spPr>
+            <a:xfrm>
+              <a:off x="8143094" y="102393"/>
+              <a:ext cx="1137403" cy="805281"/>
+            </a:xfrm>
+            <a:prstGeom prst="rect">
+              <a:avLst/>
+            </a:prstGeom>
+          </p:spPr>
+        </p:pic>
+        <p:sp>
+          <p:nvSpPr>
+            <p:cNvPr id="16" name="TextBox 15">
+              <a:extLst>
+                <a:ext uri="{FF2B5EF4-FFF2-40B4-BE49-F238E27FC236}">
+                  <a16:creationId xmlns:a16="http://schemas.microsoft.com/office/drawing/2014/main" id="{D29DAAC2-A697-EF0B-93FC-1083115776EC}"/>
+                </a:ext>
+              </a:extLst>
+            </p:cNvPr>
+            <p:cNvSpPr txBox="1"/>
+            <p:nvPr userDrawn="1"/>
+          </p:nvSpPr>
+          <p:spPr>
+            <a:xfrm>
+              <a:off x="7698259" y="12356"/>
+              <a:ext cx="1438214" cy="246221"/>
+            </a:xfrm>
+            <a:prstGeom prst="rect">
+              <a:avLst/>
+            </a:prstGeom>
+            <a:noFill/>
+          </p:spPr>
+          <p:txBody>
+            <a:bodyPr wrap="none" rtlCol="0">
+              <a:spAutoFit/>
+            </a:bodyPr>
+            <a:lstStyle/>
+            <a:p>
+              <a:r>
+                <a:rPr lang="fr-BE" sz="1000" i="1" dirty="0" err="1">
+                  <a:latin typeface="Microsoft JhengHei Light" panose="020B0304030504040204" pitchFamily="34" charset="-120"/>
+                  <a:ea typeface="Microsoft JhengHei Light" panose="020B0304030504040204" pitchFamily="34" charset="-120"/>
+                </a:rPr>
+                <a:t>powered</a:t>
+              </a:r>
+              <a:r>
+                <a:rPr lang="fr-BE" sz="1000" i="1" dirty="0">
+                  <a:latin typeface="Microsoft JhengHei Light" panose="020B0304030504040204" pitchFamily="34" charset="-120"/>
+                  <a:ea typeface="Microsoft JhengHei Light" panose="020B0304030504040204" pitchFamily="34" charset="-120"/>
+                </a:rPr>
+                <a:t> </a:t>
+              </a:r>
+              <a:r>
+                <a:rPr lang="fr-BE" sz="1000" i="1" dirty="0" err="1">
+                  <a:latin typeface="Microsoft JhengHei Light" panose="020B0304030504040204" pitchFamily="34" charset="-120"/>
+                  <a:ea typeface="Microsoft JhengHei Light" panose="020B0304030504040204" pitchFamily="34" charset="-120"/>
+                </a:rPr>
+                <a:t>with</a:t>
+              </a:r>
+              <a:r>
+                <a:rPr lang="fr-BE" sz="1000" i="1" dirty="0">
+                  <a:latin typeface="Microsoft JhengHei Light" panose="020B0304030504040204" pitchFamily="34" charset="-120"/>
+                  <a:ea typeface="Microsoft JhengHei Light" panose="020B0304030504040204" pitchFamily="34" charset="-120"/>
+                </a:rPr>
+                <a:t> love by</a:t>
+              </a:r>
+            </a:p>
+          </p:txBody>
+        </p:sp>
+      </p:grpSp>
     </p:spTree>
     <p:extLst>
       <p:ext uri="{BB962C8B-B14F-4D97-AF65-F5344CB8AC3E}">
@@ -2033,7 +2785,7 @@
           <a:lstStyle>
             <a:lvl1pPr marL="0" indent="0">
               <a:buNone/>
-              <a:defRPr sz="1800" b="1"/>
+              <a:defRPr sz="1400" b="1"/>
             </a:lvl1pPr>
             <a:lvl2pPr marL="342900" indent="0">
               <a:buNone/>
@@ -2071,7 +2823,7 @@
           <a:p>
             <a:pPr lvl="0"/>
             <a:r>
-              <a:rPr lang="en-US"/>
+              <a:rPr lang="en-US" dirty="0"/>
               <a:t>Click to edit Master text styles</a:t>
             </a:r>
           </a:p>
@@ -2094,22 +2846,24 @@
           </a:xfrm>
         </p:spPr>
         <p:txBody>
-          <a:bodyPr/>
+          <a:bodyPr>
+            <a:normAutofit/>
+          </a:bodyPr>
           <a:lstStyle>
             <a:lvl1pPr>
-              <a:defRPr sz="1800"/>
+              <a:defRPr sz="1400"/>
             </a:lvl1pPr>
             <a:lvl2pPr>
-              <a:defRPr sz="1500"/>
+              <a:defRPr sz="1200"/>
             </a:lvl2pPr>
             <a:lvl3pPr>
-              <a:defRPr sz="1350"/>
+              <a:defRPr sz="1100"/>
             </a:lvl3pPr>
             <a:lvl4pPr>
-              <a:defRPr sz="1200"/>
+              <a:defRPr sz="1050"/>
             </a:lvl4pPr>
             <a:lvl5pPr>
-              <a:defRPr sz="1200"/>
+              <a:defRPr sz="1050"/>
             </a:lvl5pPr>
             <a:lvl6pPr>
               <a:defRPr sz="1200"/>
@@ -2127,35 +2881,35 @@
           <a:p>
             <a:pPr lvl="0"/>
             <a:r>
-              <a:rPr lang="en-US"/>
+              <a:rPr lang="en-US" dirty="0"/>
               <a:t>Click to edit Master text styles</a:t>
             </a:r>
           </a:p>
           <a:p>
             <a:pPr lvl="1"/>
             <a:r>
-              <a:rPr lang="en-US"/>
+              <a:rPr lang="en-US" dirty="0"/>
               <a:t>Second level</a:t>
             </a:r>
           </a:p>
           <a:p>
             <a:pPr lvl="2"/>
             <a:r>
-              <a:rPr lang="en-US"/>
+              <a:rPr lang="en-US" dirty="0"/>
               <a:t>Third level</a:t>
             </a:r>
           </a:p>
           <a:p>
             <a:pPr lvl="3"/>
             <a:r>
-              <a:rPr lang="en-US"/>
+              <a:rPr lang="en-US" dirty="0"/>
               <a:t>Fourth level</a:t>
             </a:r>
           </a:p>
           <a:p>
             <a:pPr lvl="4"/>
             <a:r>
-              <a:rPr lang="en-US"/>
+              <a:rPr lang="en-US" dirty="0"/>
               <a:t>Fifth level</a:t>
             </a:r>
           </a:p>
@@ -2182,7 +2936,7 @@
           <a:lstStyle>
             <a:lvl1pPr marL="0" indent="0">
               <a:buNone/>
-              <a:defRPr sz="1800" b="1"/>
+              <a:defRPr sz="1400" b="1"/>
             </a:lvl1pPr>
             <a:lvl2pPr marL="342900" indent="0">
               <a:buNone/>
@@ -2243,22 +2997,24 @@
           </a:xfrm>
         </p:spPr>
         <p:txBody>
-          <a:bodyPr/>
+          <a:bodyPr>
+            <a:normAutofit/>
+          </a:bodyPr>
           <a:lstStyle>
             <a:lvl1pPr>
-              <a:defRPr sz="1800"/>
+              <a:defRPr sz="1400"/>
             </a:lvl1pPr>
             <a:lvl2pPr>
-              <a:defRPr sz="1500"/>
+              <a:defRPr sz="1200"/>
             </a:lvl2pPr>
             <a:lvl3pPr>
-              <a:defRPr sz="1350"/>
+              <a:defRPr sz="1100"/>
             </a:lvl3pPr>
             <a:lvl4pPr>
-              <a:defRPr sz="1200"/>
+              <a:defRPr sz="1050"/>
             </a:lvl4pPr>
             <a:lvl5pPr>
-              <a:defRPr sz="1200"/>
+              <a:defRPr sz="1050"/>
             </a:lvl5pPr>
             <a:lvl6pPr>
               <a:defRPr sz="1200"/>
@@ -2375,6 +3131,212 @@
           </a:p>
         </p:txBody>
       </p:sp>
+      <p:grpSp>
+        <p:nvGrpSpPr>
+          <p:cNvPr id="14" name="Group 13">
+            <a:extLst>
+              <a:ext uri="{FF2B5EF4-FFF2-40B4-BE49-F238E27FC236}">
+                <a16:creationId xmlns:a16="http://schemas.microsoft.com/office/drawing/2014/main" id="{DCCC7FF8-E932-40A0-F176-E0C360EAC087}"/>
+              </a:ext>
+            </a:extLst>
+          </p:cNvPr>
+          <p:cNvGrpSpPr/>
+          <p:nvPr userDrawn="1"/>
+        </p:nvGrpSpPr>
+        <p:grpSpPr>
+          <a:xfrm>
+            <a:off x="457200" y="-102623"/>
+            <a:ext cx="8823297" cy="1315130"/>
+            <a:chOff x="457200" y="-102623"/>
+            <a:chExt cx="8823297" cy="1315130"/>
+          </a:xfrm>
+        </p:grpSpPr>
+        <p:cxnSp>
+          <p:nvCxnSpPr>
+            <p:cNvPr id="15" name="Straight Connector 14">
+              <a:extLst>
+                <a:ext uri="{FF2B5EF4-FFF2-40B4-BE49-F238E27FC236}">
+                  <a16:creationId xmlns:a16="http://schemas.microsoft.com/office/drawing/2014/main" id="{99461804-FC82-7F6B-B40F-C0F2D338B210}"/>
+                </a:ext>
+              </a:extLst>
+            </p:cNvPr>
+            <p:cNvCxnSpPr>
+              <a:cxnSpLocks/>
+            </p:cNvCxnSpPr>
+            <p:nvPr userDrawn="1"/>
+          </p:nvCxnSpPr>
+          <p:spPr>
+            <a:xfrm>
+              <a:off x="457200" y="1063229"/>
+              <a:ext cx="8686800" cy="0"/>
+            </a:xfrm>
+            <a:prstGeom prst="line">
+              <a:avLst/>
+            </a:prstGeom>
+            <a:ln w="9525"/>
+            <a:effectLst/>
+          </p:spPr>
+          <p:style>
+            <a:lnRef idx="2">
+              <a:schemeClr val="accent2"/>
+            </a:lnRef>
+            <a:fillRef idx="0">
+              <a:schemeClr val="accent2"/>
+            </a:fillRef>
+            <a:effectRef idx="1">
+              <a:schemeClr val="accent2"/>
+            </a:effectRef>
+            <a:fontRef idx="minor">
+              <a:schemeClr val="tx1"/>
+            </a:fontRef>
+          </p:style>
+        </p:cxnSp>
+        <p:sp>
+          <p:nvSpPr>
+            <p:cNvPr id="16" name="Right Triangle 15">
+              <a:extLst>
+                <a:ext uri="{FF2B5EF4-FFF2-40B4-BE49-F238E27FC236}">
+                  <a16:creationId xmlns:a16="http://schemas.microsoft.com/office/drawing/2014/main" id="{D7457270-5897-B827-9971-6DD7A176CAAC}"/>
+                </a:ext>
+              </a:extLst>
+            </p:cNvPr>
+            <p:cNvSpPr/>
+            <p:nvPr userDrawn="1"/>
+          </p:nvSpPr>
+          <p:spPr>
+            <a:xfrm rot="10800000">
+              <a:off x="6765897" y="-102623"/>
+              <a:ext cx="2483708" cy="1315130"/>
+            </a:xfrm>
+            <a:prstGeom prst="rtTriangle">
+              <a:avLst/>
+            </a:prstGeom>
+            <a:solidFill>
+              <a:schemeClr val="accent5">
+                <a:lumMod val="20000"/>
+                <a:lumOff val="80000"/>
+              </a:schemeClr>
+            </a:solidFill>
+            <a:ln>
+              <a:noFill/>
+            </a:ln>
+          </p:spPr>
+          <p:style>
+            <a:lnRef idx="1">
+              <a:schemeClr val="accent1"/>
+            </a:lnRef>
+            <a:fillRef idx="3">
+              <a:schemeClr val="accent1"/>
+            </a:fillRef>
+            <a:effectRef idx="2">
+              <a:schemeClr val="accent1"/>
+            </a:effectRef>
+            <a:fontRef idx="minor">
+              <a:schemeClr val="lt1"/>
+            </a:fontRef>
+          </p:style>
+          <p:txBody>
+            <a:bodyPr rtlCol="0" anchor="ctr"/>
+            <a:lstStyle/>
+            <a:p>
+              <a:pPr algn="ctr"/>
+              <a:endParaRPr lang="fr-BE">
+                <a:latin typeface="Microsoft JhengHei Light" panose="020B0304030504040204" pitchFamily="34" charset="-120"/>
+                <a:ea typeface="Microsoft JhengHei Light" panose="020B0304030504040204" pitchFamily="34" charset="-120"/>
+              </a:endParaRPr>
+            </a:p>
+          </p:txBody>
+        </p:sp>
+        <p:pic>
+          <p:nvPicPr>
+            <p:cNvPr id="17" name="Picture 16" descr="A logo with blue circles and a green heart&#10;&#10;AI-generated content may be incorrect.">
+              <a:extLst>
+                <a:ext uri="{FF2B5EF4-FFF2-40B4-BE49-F238E27FC236}">
+                  <a16:creationId xmlns:a16="http://schemas.microsoft.com/office/drawing/2014/main" id="{10895732-3197-A7D0-2C4E-42042407EED4}"/>
+                </a:ext>
+              </a:extLst>
+            </p:cNvPr>
+            <p:cNvPicPr>
+              <a:picLocks noChangeAspect="1"/>
+            </p:cNvPicPr>
+            <p:nvPr userDrawn="1"/>
+          </p:nvPicPr>
+          <p:blipFill>
+            <a:blip r:embed="rId2"/>
+            <a:stretch>
+              <a:fillRect/>
+            </a:stretch>
+          </p:blipFill>
+          <p:spPr>
+            <a:xfrm>
+              <a:off x="8143094" y="102393"/>
+              <a:ext cx="1137403" cy="805281"/>
+            </a:xfrm>
+            <a:prstGeom prst="rect">
+              <a:avLst/>
+            </a:prstGeom>
+          </p:spPr>
+        </p:pic>
+        <p:sp>
+          <p:nvSpPr>
+            <p:cNvPr id="18" name="TextBox 17">
+              <a:extLst>
+                <a:ext uri="{FF2B5EF4-FFF2-40B4-BE49-F238E27FC236}">
+                  <a16:creationId xmlns:a16="http://schemas.microsoft.com/office/drawing/2014/main" id="{B9471584-97DE-43E5-92C1-4B87A90E7C97}"/>
+                </a:ext>
+              </a:extLst>
+            </p:cNvPr>
+            <p:cNvSpPr txBox="1"/>
+            <p:nvPr userDrawn="1"/>
+          </p:nvSpPr>
+          <p:spPr>
+            <a:xfrm>
+              <a:off x="7698259" y="12356"/>
+              <a:ext cx="1438214" cy="246221"/>
+            </a:xfrm>
+            <a:prstGeom prst="rect">
+              <a:avLst/>
+            </a:prstGeom>
+            <a:noFill/>
+          </p:spPr>
+          <p:txBody>
+            <a:bodyPr wrap="none" rtlCol="0">
+              <a:spAutoFit/>
+            </a:bodyPr>
+            <a:lstStyle/>
+            <a:p>
+              <a:r>
+                <a:rPr lang="fr-BE" sz="1000" i="1" dirty="0" err="1">
+                  <a:latin typeface="Microsoft JhengHei Light" panose="020B0304030504040204" pitchFamily="34" charset="-120"/>
+                  <a:ea typeface="Microsoft JhengHei Light" panose="020B0304030504040204" pitchFamily="34" charset="-120"/>
+                </a:rPr>
+                <a:t>powered</a:t>
+              </a:r>
+              <a:r>
+                <a:rPr lang="fr-BE" sz="1000" i="1" dirty="0">
+                  <a:latin typeface="Microsoft JhengHei Light" panose="020B0304030504040204" pitchFamily="34" charset="-120"/>
+                  <a:ea typeface="Microsoft JhengHei Light" panose="020B0304030504040204" pitchFamily="34" charset="-120"/>
+                </a:rPr>
+                <a:t> </a:t>
+              </a:r>
+              <a:r>
+                <a:rPr lang="fr-BE" sz="1000" i="1" dirty="0" err="1">
+                  <a:latin typeface="Microsoft JhengHei Light" panose="020B0304030504040204" pitchFamily="34" charset="-120"/>
+                  <a:ea typeface="Microsoft JhengHei Light" panose="020B0304030504040204" pitchFamily="34" charset="-120"/>
+                </a:rPr>
+                <a:t>with</a:t>
+              </a:r>
+              <a:r>
+                <a:rPr lang="fr-BE" sz="1000" i="1" dirty="0">
+                  <a:latin typeface="Microsoft JhengHei Light" panose="020B0304030504040204" pitchFamily="34" charset="-120"/>
+                  <a:ea typeface="Microsoft JhengHei Light" panose="020B0304030504040204" pitchFamily="34" charset="-120"/>
+                </a:rPr>
+                <a:t> love by</a:t>
+              </a:r>
+            </a:p>
+          </p:txBody>
+        </p:sp>
+      </p:grpSp>
     </p:spTree>
     <p:extLst>
       <p:ext uri="{BB962C8B-B14F-4D97-AF65-F5344CB8AC3E}">
@@ -2492,6 +3454,151 @@
           </a:p>
         </p:txBody>
       </p:sp>
+      <p:sp>
+        <p:nvSpPr>
+          <p:cNvPr id="7" name="Right Triangle 6">
+            <a:extLst>
+              <a:ext uri="{FF2B5EF4-FFF2-40B4-BE49-F238E27FC236}">
+                <a16:creationId xmlns:a16="http://schemas.microsoft.com/office/drawing/2014/main" id="{AC93A38E-BA46-12A7-8A4A-48F25090A359}"/>
+              </a:ext>
+            </a:extLst>
+          </p:cNvPr>
+          <p:cNvSpPr/>
+          <p:nvPr userDrawn="1"/>
+        </p:nvSpPr>
+        <p:spPr>
+          <a:xfrm rot="10800000">
+            <a:off x="6765897" y="-102623"/>
+            <a:ext cx="2483708" cy="1315130"/>
+          </a:xfrm>
+          <a:prstGeom prst="rtTriangle">
+            <a:avLst/>
+          </a:prstGeom>
+          <a:solidFill>
+            <a:schemeClr val="accent5">
+              <a:lumMod val="20000"/>
+              <a:lumOff val="80000"/>
+            </a:schemeClr>
+          </a:solidFill>
+          <a:ln>
+            <a:noFill/>
+          </a:ln>
+        </p:spPr>
+        <p:style>
+          <a:lnRef idx="1">
+            <a:schemeClr val="accent1"/>
+          </a:lnRef>
+          <a:fillRef idx="3">
+            <a:schemeClr val="accent1"/>
+          </a:fillRef>
+          <a:effectRef idx="2">
+            <a:schemeClr val="accent1"/>
+          </a:effectRef>
+          <a:fontRef idx="minor">
+            <a:schemeClr val="lt1"/>
+          </a:fontRef>
+        </p:style>
+        <p:txBody>
+          <a:bodyPr rtlCol="0" anchor="ctr"/>
+          <a:lstStyle/>
+          <a:p>
+            <a:pPr algn="ctr"/>
+            <a:endParaRPr lang="fr-BE">
+              <a:latin typeface="Microsoft JhengHei Light" panose="020B0304030504040204" pitchFamily="34" charset="-120"/>
+              <a:ea typeface="Microsoft JhengHei Light" panose="020B0304030504040204" pitchFamily="34" charset="-120"/>
+            </a:endParaRPr>
+          </a:p>
+        </p:txBody>
+      </p:sp>
+      <p:pic>
+        <p:nvPicPr>
+          <p:cNvPr id="8" name="Picture 7" descr="A logo with blue circles and a green heart&#10;&#10;AI-generated content may be incorrect.">
+            <a:extLst>
+              <a:ext uri="{FF2B5EF4-FFF2-40B4-BE49-F238E27FC236}">
+                <a16:creationId xmlns:a16="http://schemas.microsoft.com/office/drawing/2014/main" id="{6314B322-3125-5421-99CC-0F0D44FF9558}"/>
+              </a:ext>
+            </a:extLst>
+          </p:cNvPr>
+          <p:cNvPicPr>
+            <a:picLocks noChangeAspect="1"/>
+          </p:cNvPicPr>
+          <p:nvPr userDrawn="1"/>
+        </p:nvPicPr>
+        <p:blipFill>
+          <a:blip r:embed="rId2"/>
+          <a:stretch>
+            <a:fillRect/>
+          </a:stretch>
+        </p:blipFill>
+        <p:spPr>
+          <a:xfrm>
+            <a:off x="8143094" y="102393"/>
+            <a:ext cx="1137403" cy="805281"/>
+          </a:xfrm>
+          <a:prstGeom prst="rect">
+            <a:avLst/>
+          </a:prstGeom>
+        </p:spPr>
+      </p:pic>
+      <p:sp>
+        <p:nvSpPr>
+          <p:cNvPr id="9" name="TextBox 8">
+            <a:extLst>
+              <a:ext uri="{FF2B5EF4-FFF2-40B4-BE49-F238E27FC236}">
+                <a16:creationId xmlns:a16="http://schemas.microsoft.com/office/drawing/2014/main" id="{9423DB3D-D989-6BD7-D71C-D1D0E051AA49}"/>
+              </a:ext>
+            </a:extLst>
+          </p:cNvPr>
+          <p:cNvSpPr txBox="1"/>
+          <p:nvPr userDrawn="1"/>
+        </p:nvSpPr>
+        <p:spPr>
+          <a:xfrm>
+            <a:off x="7698259" y="12356"/>
+            <a:ext cx="1438214" cy="246221"/>
+          </a:xfrm>
+          <a:prstGeom prst="rect">
+            <a:avLst/>
+          </a:prstGeom>
+          <a:noFill/>
+        </p:spPr>
+        <p:txBody>
+          <a:bodyPr wrap="none" rtlCol="0">
+            <a:spAutoFit/>
+          </a:bodyPr>
+          <a:lstStyle/>
+          <a:p>
+            <a:r>
+              <a:rPr lang="fr-BE" sz="1000" i="1" dirty="0" err="1">
+                <a:latin typeface="Microsoft JhengHei Light" panose="020B0304030504040204" pitchFamily="34" charset="-120"/>
+                <a:ea typeface="Microsoft JhengHei Light" panose="020B0304030504040204" pitchFamily="34" charset="-120"/>
+              </a:rPr>
+              <a:t>powered</a:t>
+            </a:r>
+            <a:r>
+              <a:rPr lang="fr-BE" sz="1000" i="1" dirty="0">
+                <a:latin typeface="Microsoft JhengHei Light" panose="020B0304030504040204" pitchFamily="34" charset="-120"/>
+                <a:ea typeface="Microsoft JhengHei Light" panose="020B0304030504040204" pitchFamily="34" charset="-120"/>
+              </a:rPr>
+              <a:t> </a:t>
+            </a:r>
+            <a:r>
+              <a:rPr lang="fr-BE" sz="1000" i="1" dirty="0" err="1">
+                <a:latin typeface="Microsoft JhengHei Light" panose="020B0304030504040204" pitchFamily="34" charset="-120"/>
+                <a:ea typeface="Microsoft JhengHei Light" panose="020B0304030504040204" pitchFamily="34" charset="-120"/>
+              </a:rPr>
+              <a:t>with</a:t>
+            </a:r>
+            <a:r>
+              <a:rPr lang="fr-BE" sz="1000" i="1" dirty="0">
+                <a:latin typeface="Microsoft JhengHei Light" panose="020B0304030504040204" pitchFamily="34" charset="-120"/>
+                <a:ea typeface="Microsoft JhengHei Light" panose="020B0304030504040204" pitchFamily="34" charset="-120"/>
+              </a:rPr>
+              <a:t> love by</a:t>
+            </a:r>
+          </a:p>
+        </p:txBody>
+      </p:sp>
     </p:spTree>
     <p:extLst>
       <p:ext uri="{BB962C8B-B14F-4D97-AF65-F5344CB8AC3E}">
@@ -2587,6 +3694,151 @@
           </a:p>
         </p:txBody>
       </p:sp>
+      <p:sp>
+        <p:nvSpPr>
+          <p:cNvPr id="6" name="Right Triangle 5">
+            <a:extLst>
+              <a:ext uri="{FF2B5EF4-FFF2-40B4-BE49-F238E27FC236}">
+                <a16:creationId xmlns:a16="http://schemas.microsoft.com/office/drawing/2014/main" id="{16278CA2-D319-C2D3-9295-47EA99D6260A}"/>
+              </a:ext>
+            </a:extLst>
+          </p:cNvPr>
+          <p:cNvSpPr/>
+          <p:nvPr userDrawn="1"/>
+        </p:nvSpPr>
+        <p:spPr>
+          <a:xfrm rot="10800000">
+            <a:off x="6765897" y="-102623"/>
+            <a:ext cx="2483708" cy="1315130"/>
+          </a:xfrm>
+          <a:prstGeom prst="rtTriangle">
+            <a:avLst/>
+          </a:prstGeom>
+          <a:solidFill>
+            <a:schemeClr val="accent5">
+              <a:lumMod val="20000"/>
+              <a:lumOff val="80000"/>
+            </a:schemeClr>
+          </a:solidFill>
+          <a:ln>
+            <a:noFill/>
+          </a:ln>
+        </p:spPr>
+        <p:style>
+          <a:lnRef idx="1">
+            <a:schemeClr val="accent1"/>
+          </a:lnRef>
+          <a:fillRef idx="3">
+            <a:schemeClr val="accent1"/>
+          </a:fillRef>
+          <a:effectRef idx="2">
+            <a:schemeClr val="accent1"/>
+          </a:effectRef>
+          <a:fontRef idx="minor">
+            <a:schemeClr val="lt1"/>
+          </a:fontRef>
+        </p:style>
+        <p:txBody>
+          <a:bodyPr rtlCol="0" anchor="ctr"/>
+          <a:lstStyle/>
+          <a:p>
+            <a:pPr algn="ctr"/>
+            <a:endParaRPr lang="fr-BE">
+              <a:latin typeface="Microsoft JhengHei Light" panose="020B0304030504040204" pitchFamily="34" charset="-120"/>
+              <a:ea typeface="Microsoft JhengHei Light" panose="020B0304030504040204" pitchFamily="34" charset="-120"/>
+            </a:endParaRPr>
+          </a:p>
+        </p:txBody>
+      </p:sp>
+      <p:pic>
+        <p:nvPicPr>
+          <p:cNvPr id="7" name="Picture 6" descr="A logo with blue circles and a green heart&#10;&#10;AI-generated content may be incorrect.">
+            <a:extLst>
+              <a:ext uri="{FF2B5EF4-FFF2-40B4-BE49-F238E27FC236}">
+                <a16:creationId xmlns:a16="http://schemas.microsoft.com/office/drawing/2014/main" id="{644D84C8-165C-7DC5-0EFB-E3C64521D0B1}"/>
+              </a:ext>
+            </a:extLst>
+          </p:cNvPr>
+          <p:cNvPicPr>
+            <a:picLocks noChangeAspect="1"/>
+          </p:cNvPicPr>
+          <p:nvPr userDrawn="1"/>
+        </p:nvPicPr>
+        <p:blipFill>
+          <a:blip r:embed="rId2"/>
+          <a:stretch>
+            <a:fillRect/>
+          </a:stretch>
+        </p:blipFill>
+        <p:spPr>
+          <a:xfrm>
+            <a:off x="8143094" y="102393"/>
+            <a:ext cx="1137403" cy="805281"/>
+          </a:xfrm>
+          <a:prstGeom prst="rect">
+            <a:avLst/>
+          </a:prstGeom>
+        </p:spPr>
+      </p:pic>
+      <p:sp>
+        <p:nvSpPr>
+          <p:cNvPr id="8" name="TextBox 7">
+            <a:extLst>
+              <a:ext uri="{FF2B5EF4-FFF2-40B4-BE49-F238E27FC236}">
+                <a16:creationId xmlns:a16="http://schemas.microsoft.com/office/drawing/2014/main" id="{A42606EB-1EEF-ED34-2320-2F14BB07E35F}"/>
+              </a:ext>
+            </a:extLst>
+          </p:cNvPr>
+          <p:cNvSpPr txBox="1"/>
+          <p:nvPr userDrawn="1"/>
+        </p:nvSpPr>
+        <p:spPr>
+          <a:xfrm>
+            <a:off x="7698259" y="12356"/>
+            <a:ext cx="1438214" cy="246221"/>
+          </a:xfrm>
+          <a:prstGeom prst="rect">
+            <a:avLst/>
+          </a:prstGeom>
+          <a:noFill/>
+        </p:spPr>
+        <p:txBody>
+          <a:bodyPr wrap="none" rtlCol="0">
+            <a:spAutoFit/>
+          </a:bodyPr>
+          <a:lstStyle/>
+          <a:p>
+            <a:r>
+              <a:rPr lang="fr-BE" sz="1000" i="1" dirty="0" err="1">
+                <a:latin typeface="Microsoft JhengHei Light" panose="020B0304030504040204" pitchFamily="34" charset="-120"/>
+                <a:ea typeface="Microsoft JhengHei Light" panose="020B0304030504040204" pitchFamily="34" charset="-120"/>
+              </a:rPr>
+              <a:t>powered</a:t>
+            </a:r>
+            <a:r>
+              <a:rPr lang="fr-BE" sz="1000" i="1" dirty="0">
+                <a:latin typeface="Microsoft JhengHei Light" panose="020B0304030504040204" pitchFamily="34" charset="-120"/>
+                <a:ea typeface="Microsoft JhengHei Light" panose="020B0304030504040204" pitchFamily="34" charset="-120"/>
+              </a:rPr>
+              <a:t> </a:t>
+            </a:r>
+            <a:r>
+              <a:rPr lang="fr-BE" sz="1000" i="1" dirty="0" err="1">
+                <a:latin typeface="Microsoft JhengHei Light" panose="020B0304030504040204" pitchFamily="34" charset="-120"/>
+                <a:ea typeface="Microsoft JhengHei Light" panose="020B0304030504040204" pitchFamily="34" charset="-120"/>
+              </a:rPr>
+              <a:t>with</a:t>
+            </a:r>
+            <a:r>
+              <a:rPr lang="fr-BE" sz="1000" i="1" dirty="0">
+                <a:latin typeface="Microsoft JhengHei Light" panose="020B0304030504040204" pitchFamily="34" charset="-120"/>
+                <a:ea typeface="Microsoft JhengHei Light" panose="020B0304030504040204" pitchFamily="34" charset="-120"/>
+              </a:rPr>
+              <a:t> love by</a:t>
+            </a:r>
+          </a:p>
+        </p:txBody>
+      </p:sp>
     </p:spTree>
     <p:extLst>
       <p:ext uri="{BB962C8B-B14F-4D97-AF65-F5344CB8AC3E}">
@@ -2665,22 +3917,24 @@
           </a:xfrm>
         </p:spPr>
         <p:txBody>
-          <a:bodyPr/>
+          <a:bodyPr>
+            <a:normAutofit/>
+          </a:bodyPr>
           <a:lstStyle>
             <a:lvl1pPr>
-              <a:defRPr sz="2400"/>
+              <a:defRPr sz="1400"/>
             </a:lvl1pPr>
             <a:lvl2pPr>
-              <a:defRPr sz="2100"/>
+              <a:defRPr sz="1400"/>
             </a:lvl2pPr>
             <a:lvl3pPr>
-              <a:defRPr sz="1800"/>
+              <a:defRPr sz="1100"/>
             </a:lvl3pPr>
             <a:lvl4pPr>
-              <a:defRPr sz="1500"/>
+              <a:defRPr sz="1050"/>
             </a:lvl4pPr>
             <a:lvl5pPr>
-              <a:defRPr sz="1500"/>
+              <a:defRPr sz="1050"/>
             </a:lvl5pPr>
             <a:lvl6pPr>
               <a:defRPr sz="1500"/>
@@ -3151,62 +4405,6 @@
       </p:grpSpPr>
       <p:sp>
         <p:nvSpPr>
-          <p:cNvPr id="11" name="Right Triangle 10">
-            <a:extLst>
-              <a:ext uri="{FF2B5EF4-FFF2-40B4-BE49-F238E27FC236}">
-                <a16:creationId xmlns:a16="http://schemas.microsoft.com/office/drawing/2014/main" id="{222A67BA-BE52-FC72-4FBB-EA6BED7666C4}"/>
-              </a:ext>
-            </a:extLst>
-          </p:cNvPr>
-          <p:cNvSpPr/>
-          <p:nvPr userDrawn="1"/>
-        </p:nvSpPr>
-        <p:spPr>
-          <a:xfrm rot="10800000">
-            <a:off x="6765897" y="-102623"/>
-            <a:ext cx="2483708" cy="1315130"/>
-          </a:xfrm>
-          <a:prstGeom prst="rtTriangle">
-            <a:avLst/>
-          </a:prstGeom>
-          <a:solidFill>
-            <a:schemeClr val="accent5">
-              <a:lumMod val="20000"/>
-              <a:lumOff val="80000"/>
-            </a:schemeClr>
-          </a:solidFill>
-          <a:ln>
-            <a:noFill/>
-          </a:ln>
-        </p:spPr>
-        <p:style>
-          <a:lnRef idx="1">
-            <a:schemeClr val="accent1"/>
-          </a:lnRef>
-          <a:fillRef idx="3">
-            <a:schemeClr val="accent1"/>
-          </a:fillRef>
-          <a:effectRef idx="2">
-            <a:schemeClr val="accent1"/>
-          </a:effectRef>
-          <a:fontRef idx="minor">
-            <a:schemeClr val="lt1"/>
-          </a:fontRef>
-        </p:style>
-        <p:txBody>
-          <a:bodyPr rtlCol="0" anchor="ctr"/>
-          <a:lstStyle/>
-          <a:p>
-            <a:pPr algn="ctr"/>
-            <a:endParaRPr lang="fr-BE">
-              <a:latin typeface="Microsoft JhengHei Light" panose="020B0304030504040204" pitchFamily="34" charset="-120"/>
-              <a:ea typeface="Microsoft JhengHei Light" panose="020B0304030504040204" pitchFamily="34" charset="-120"/>
-            </a:endParaRPr>
-          </a:p>
-        </p:txBody>
-      </p:sp>
-      <p:sp>
-        <p:nvSpPr>
           <p:cNvPr id="2" name="Title Placeholder 1"/>
           <p:cNvSpPr>
             <a:spLocks noGrp="1"/>
@@ -3422,95 +4620,6 @@
               <a:t>‹#›</a:t>
             </a:fld>
             <a:endParaRPr lang="en-US"/>
-          </a:p>
-        </p:txBody>
-      </p:sp>
-      <p:pic>
-        <p:nvPicPr>
-          <p:cNvPr id="8" name="Picture 7" descr="A logo with blue circles and a green heart&#10;&#10;AI-generated content may be incorrect.">
-            <a:extLst>
-              <a:ext uri="{FF2B5EF4-FFF2-40B4-BE49-F238E27FC236}">
-                <a16:creationId xmlns:a16="http://schemas.microsoft.com/office/drawing/2014/main" id="{AD35A1B8-70CD-E588-6492-DE8BEEB0986B}"/>
-              </a:ext>
-            </a:extLst>
-          </p:cNvPr>
-          <p:cNvPicPr>
-            <a:picLocks noChangeAspect="1"/>
-          </p:cNvPicPr>
-          <p:nvPr userDrawn="1"/>
-        </p:nvPicPr>
-        <p:blipFill>
-          <a:blip r:embed="rId13"/>
-          <a:stretch>
-            <a:fillRect/>
-          </a:stretch>
-        </p:blipFill>
-        <p:spPr>
-          <a:xfrm>
-            <a:off x="8143094" y="102393"/>
-            <a:ext cx="1137403" cy="805281"/>
-          </a:xfrm>
-          <a:prstGeom prst="rect">
-            <a:avLst/>
-          </a:prstGeom>
-        </p:spPr>
-      </p:pic>
-      <p:sp>
-        <p:nvSpPr>
-          <p:cNvPr id="9" name="TextBox 8">
-            <a:extLst>
-              <a:ext uri="{FF2B5EF4-FFF2-40B4-BE49-F238E27FC236}">
-                <a16:creationId xmlns:a16="http://schemas.microsoft.com/office/drawing/2014/main" id="{37F90391-B56F-D707-CEEE-90E51666CD05}"/>
-              </a:ext>
-            </a:extLst>
-          </p:cNvPr>
-          <p:cNvSpPr txBox="1"/>
-          <p:nvPr userDrawn="1"/>
-        </p:nvSpPr>
-        <p:spPr>
-          <a:xfrm>
-            <a:off x="7698259" y="12356"/>
-            <a:ext cx="1438214" cy="246221"/>
-          </a:xfrm>
-          <a:prstGeom prst="rect">
-            <a:avLst/>
-          </a:prstGeom>
-          <a:noFill/>
-        </p:spPr>
-        <p:txBody>
-          <a:bodyPr wrap="none" rtlCol="0">
-            <a:spAutoFit/>
-          </a:bodyPr>
-          <a:lstStyle/>
-          <a:p>
-            <a:r>
-              <a:rPr lang="fr-BE" sz="1000" i="1" dirty="0" err="1">
-                <a:latin typeface="Microsoft JhengHei Light" panose="020B0304030504040204" pitchFamily="34" charset="-120"/>
-                <a:ea typeface="Microsoft JhengHei Light" panose="020B0304030504040204" pitchFamily="34" charset="-120"/>
-              </a:rPr>
-              <a:t>powered</a:t>
-            </a:r>
-            <a:r>
-              <a:rPr lang="fr-BE" sz="1000" i="1" dirty="0">
-                <a:latin typeface="Microsoft JhengHei Light" panose="020B0304030504040204" pitchFamily="34" charset="-120"/>
-                <a:ea typeface="Microsoft JhengHei Light" panose="020B0304030504040204" pitchFamily="34" charset="-120"/>
-              </a:rPr>
-              <a:t> </a:t>
-            </a:r>
-            <a:r>
-              <a:rPr lang="fr-BE" sz="1000" i="1" dirty="0" err="1">
-                <a:latin typeface="Microsoft JhengHei Light" panose="020B0304030504040204" pitchFamily="34" charset="-120"/>
-                <a:ea typeface="Microsoft JhengHei Light" panose="020B0304030504040204" pitchFamily="34" charset="-120"/>
-              </a:rPr>
-              <a:t>with</a:t>
-            </a:r>
-            <a:r>
-              <a:rPr lang="fr-BE" sz="1000" i="1" dirty="0">
-                <a:latin typeface="Microsoft JhengHei Light" panose="020B0304030504040204" pitchFamily="34" charset="-120"/>
-                <a:ea typeface="Microsoft JhengHei Light" panose="020B0304030504040204" pitchFamily="34" charset="-120"/>
-              </a:rPr>
-              <a:t> love by</a:t>
-            </a:r>
           </a:p>
         </p:txBody>
       </p:sp>
@@ -3537,12 +4646,12 @@
   </p:sldLayoutIdLst>
   <p:txStyles>
     <p:titleStyle>
-      <a:lvl1pPr algn="ctr" defTabSz="342900" rtl="0" eaLnBrk="1" latinLnBrk="0" hangingPunct="1">
+      <a:lvl1pPr algn="l" defTabSz="342900" rtl="0" eaLnBrk="1" latinLnBrk="0" hangingPunct="1">
         <a:spcBef>
           <a:spcPct val="0"/>
         </a:spcBef>
         <a:buNone/>
-        <a:defRPr sz="3300" kern="1200">
+        <a:defRPr sz="1600" b="1" kern="1200">
           <a:solidFill>
             <a:schemeClr val="tx1"/>
           </a:solidFill>
@@ -3559,7 +4668,7 @@
         </a:spcBef>
         <a:buFont typeface="Arial"/>
         <a:buChar char="•"/>
-        <a:defRPr sz="2400" kern="1200">
+        <a:defRPr sz="1200" kern="1200">
           <a:solidFill>
             <a:schemeClr val="tx1"/>
           </a:solidFill>
@@ -3574,7 +4683,7 @@
         </a:spcBef>
         <a:buFont typeface="Arial"/>
         <a:buChar char="–"/>
-        <a:defRPr sz="2100" kern="1200">
+        <a:defRPr sz="1200" kern="1200">
           <a:solidFill>
             <a:schemeClr val="tx1"/>
           </a:solidFill>
@@ -3589,7 +4698,7 @@
         </a:spcBef>
         <a:buFont typeface="Arial"/>
         <a:buChar char="•"/>
-        <a:defRPr sz="1800" kern="1200">
+        <a:defRPr sz="1050" kern="1200">
           <a:solidFill>
             <a:schemeClr val="tx1"/>
           </a:solidFill>
@@ -3604,7 +4713,7 @@
         </a:spcBef>
         <a:buFont typeface="Arial"/>
         <a:buChar char="–"/>
-        <a:defRPr sz="1500" kern="1200">
+        <a:defRPr sz="1000" kern="1200">
           <a:solidFill>
             <a:schemeClr val="tx1"/>
           </a:solidFill>
@@ -3619,7 +4728,7 @@
         </a:spcBef>
         <a:buFont typeface="Arial"/>
         <a:buChar char="»"/>
-        <a:defRPr sz="1500" kern="1200">
+        <a:defRPr sz="1000" kern="1200">
           <a:solidFill>
             <a:schemeClr val="tx1"/>
           </a:solidFill>
@@ -4124,42 +5233,42 @@
 <file path=ppt/theme/theme1.xml><?xml version="1.0" encoding="utf-8"?>
 <a:theme xmlns:a="http://schemas.openxmlformats.org/drawingml/2006/main" name="Office Theme">
   <a:themeElements>
-    <a:clrScheme name="Office">
+    <a:clrScheme name="WLDS-2021">
       <a:dk1>
-        <a:sysClr val="windowText" lastClr="000000"/>
+        <a:srgbClr val="181C34"/>
       </a:dk1>
       <a:lt1>
         <a:sysClr val="window" lastClr="FFFFFF"/>
       </a:lt1>
       <a:dk2>
-        <a:srgbClr val="1F497D"/>
+        <a:srgbClr val="44546A"/>
       </a:dk2>
       <a:lt2>
-        <a:srgbClr val="EEECE1"/>
+        <a:srgbClr val="E7E6E6"/>
       </a:lt2>
       <a:accent1>
-        <a:srgbClr val="4F81BD"/>
+        <a:srgbClr val="234D8C"/>
       </a:accent1>
       <a:accent2>
-        <a:srgbClr val="C0504D"/>
+        <a:srgbClr val="5A6FAE"/>
       </a:accent2>
       <a:accent3>
-        <a:srgbClr val="9BBB59"/>
+        <a:srgbClr val="87CAC4"/>
       </a:accent3>
       <a:accent4>
-        <a:srgbClr val="8064A2"/>
+        <a:srgbClr val="78C2E8"/>
       </a:accent4>
       <a:accent5>
-        <a:srgbClr val="4BACC6"/>
+        <a:srgbClr val="26393A"/>
       </a:accent5>
       <a:accent6>
-        <a:srgbClr val="F79646"/>
+        <a:srgbClr val="85B819"/>
       </a:accent6>
       <a:hlink>
-        <a:srgbClr val="0000FF"/>
+        <a:srgbClr val="5A6FAE"/>
       </a:hlink>
       <a:folHlink>
-        <a:srgbClr val="800080"/>
+        <a:srgbClr val="78C2E8"/>
       </a:folHlink>
     </a:clrScheme>
     <a:fontScheme name="Office">

</xml_diff>